<commit_message>
Update Unity Script Week2 PPT&PDF
</commit_message>
<xml_diff>
--- a/2. 유니티 스크립트.pptx
+++ b/2. 유니티 스크립트.pptx
@@ -5,7 +5,7 @@
     <p:sldMasterId id="2147483660" r:id="rId1"/>
   </p:sldMasterIdLst>
   <p:notesMasterIdLst>
-    <p:notesMasterId r:id="rId35"/>
+    <p:notesMasterId r:id="rId36"/>
   </p:notesMasterIdLst>
   <p:sldIdLst>
     <p:sldId id="330" r:id="rId2"/>
@@ -31,45 +31,50 @@
     <p:sldId id="333" r:id="rId22"/>
     <p:sldId id="341" r:id="rId23"/>
     <p:sldId id="321" r:id="rId24"/>
-    <p:sldId id="335" r:id="rId25"/>
-    <p:sldId id="336" r:id="rId26"/>
-    <p:sldId id="342" r:id="rId27"/>
-    <p:sldId id="337" r:id="rId28"/>
-    <p:sldId id="338" r:id="rId29"/>
-    <p:sldId id="340" r:id="rId30"/>
-    <p:sldId id="334" r:id="rId31"/>
-    <p:sldId id="319" r:id="rId32"/>
-    <p:sldId id="329" r:id="rId33"/>
-    <p:sldId id="285" r:id="rId34"/>
+    <p:sldId id="351" r:id="rId25"/>
+    <p:sldId id="335" r:id="rId26"/>
+    <p:sldId id="336" r:id="rId27"/>
+    <p:sldId id="342" r:id="rId28"/>
+    <p:sldId id="337" r:id="rId29"/>
+    <p:sldId id="338" r:id="rId30"/>
+    <p:sldId id="340" r:id="rId31"/>
+    <p:sldId id="334" r:id="rId32"/>
+    <p:sldId id="319" r:id="rId33"/>
+    <p:sldId id="329" r:id="rId34"/>
+    <p:sldId id="285" r:id="rId35"/>
   </p:sldIdLst>
   <p:sldSz cx="9144000" cy="6858000" type="screen4x3"/>
   <p:notesSz cx="6858000" cy="9144000"/>
   <p:embeddedFontLst>
     <p:embeddedFont>
+      <p:font typeface="Cambria Math" panose="02040503050406030204" pitchFamily="18" charset="0"/>
+      <p:regular r:id="rId37"/>
+    </p:embeddedFont>
+    <p:embeddedFont>
+      <p:font typeface="Source Code Pro Black" panose="020B0809030403020204" pitchFamily="49" charset="0"/>
+      <p:bold r:id="rId38"/>
+      <p:boldItalic r:id="rId39"/>
+    </p:embeddedFont>
+    <p:embeddedFont>
+      <p:font typeface="Source Code Pro Semibold" panose="020B0609030403020204" pitchFamily="49" charset="0"/>
+      <p:bold r:id="rId40"/>
+      <p:boldItalic r:id="rId41"/>
+    </p:embeddedFont>
+    <p:embeddedFont>
+      <p:font typeface="Wingdings 2" panose="05020102010507070707" pitchFamily="18" charset="2"/>
+      <p:regular r:id="rId42"/>
+    </p:embeddedFont>
+    <p:embeddedFont>
       <p:font typeface="나눔스퀘어 Bold" panose="020B0600000101010101" pitchFamily="50" charset="-127"/>
-      <p:bold r:id="rId36"/>
+      <p:bold r:id="rId43"/>
     </p:embeddedFont>
     <p:embeddedFont>
       <p:font typeface="나눔스퀘어 ExtraBold" panose="020B0600000101010101" pitchFamily="50" charset="-127"/>
-      <p:bold r:id="rId37"/>
+      <p:bold r:id="rId44"/>
     </p:embeddedFont>
     <p:embeddedFont>
       <p:font typeface="나눔스퀘어_ac" panose="020B0600000101010101" pitchFamily="50" charset="-127"/>
-      <p:regular r:id="rId38"/>
-    </p:embeddedFont>
-    <p:embeddedFont>
-      <p:font typeface="Source Code Pro Black" panose="020B0809030403020204" pitchFamily="49" charset="0"/>
-      <p:bold r:id="rId39"/>
-      <p:boldItalic r:id="rId40"/>
-    </p:embeddedFont>
-    <p:embeddedFont>
-      <p:font typeface="Source Code Pro Semibold" panose="020B0609030403020204" pitchFamily="49" charset="0"/>
-      <p:bold r:id="rId41"/>
-      <p:boldItalic r:id="rId42"/>
-    </p:embeddedFont>
-    <p:embeddedFont>
-      <p:font typeface="Wingdings 2" panose="05020102010507070707" pitchFamily="18" charset="2"/>
-      <p:regular r:id="rId43"/>
+      <p:regular r:id="rId45"/>
     </p:embeddedFont>
   </p:embeddedFontLst>
   <p:defaultTextStyle>
@@ -211,6 +216,7 @@
             <p14:sldId id="333"/>
             <p14:sldId id="341"/>
             <p14:sldId id="321"/>
+            <p14:sldId id="351"/>
           </p14:sldIdLst>
         </p14:section>
         <p14:section name="4. 이동과 회전" id="{FB4D1F46-D8A6-46AA-B34C-8DE92120D4E9}">
@@ -6583,12 +6589,8 @@
           </a:lstStyle>
           <a:p>
             <a:r>
-              <a:rPr lang="en-US" altLang="ko-KR" dirty="0"/>
-              <a:t>1. </a:t>
-            </a:r>
-            <a:r>
-              <a:rPr lang="ko-KR" altLang="en-US" dirty="0"/>
-              <a:t>이건 왜 안될까요</a:t>
+              <a:rPr lang="ko-KR" altLang="en-US" dirty="0"/>
+              <a:t>왜 오류일까요</a:t>
             </a:r>
             <a:r>
               <a:rPr lang="en-US" altLang="ko-KR" dirty="0"/>
@@ -6630,19 +6632,41 @@
           <a:p>
             <a:r>
               <a:rPr lang="ko-KR" altLang="en-US" dirty="0"/>
-              <a:t>실제론 </a:t>
-            </a:r>
-            <a:r>
-              <a:rPr lang="en-US" altLang="ko-KR" dirty="0"/>
-              <a:t>=&gt; </a:t>
+              <a:t>실제론</a:t>
+            </a:r>
+            <a:r>
+              <a:rPr lang="en-US" altLang="ko-KR" dirty="0"/>
+              <a:t> `</a:t>
             </a:r>
             <a:r>
               <a:rPr lang="en-US" altLang="ko-KR" dirty="0" err="1"/>
-              <a:t>transform.GetPosition</a:t>
-            </a:r>
-            <a:r>
-              <a:rPr lang="en-US" altLang="ko-KR" dirty="0"/>
-              <a:t>().x = 10</a:t>
+              <a:t>transform.</a:t>
+            </a:r>
+            <a:r>
+              <a:rPr lang="en-US" altLang="ko-KR" dirty="0" err="1">
+                <a:solidFill>
+                  <a:schemeClr val="accent1">
+                    <a:lumMod val="40000"/>
+                    <a:lumOff val="60000"/>
+                  </a:schemeClr>
+                </a:solidFill>
+              </a:rPr>
+              <a:t>GetPosition</a:t>
+            </a:r>
+            <a:r>
+              <a:rPr lang="en-US" altLang="ko-KR" dirty="0">
+                <a:solidFill>
+                  <a:schemeClr val="accent1">
+                    <a:lumMod val="40000"/>
+                    <a:lumOff val="60000"/>
+                  </a:schemeClr>
+                </a:solidFill>
+              </a:rPr>
+              <a:t>()</a:t>
+            </a:r>
+            <a:r>
+              <a:rPr lang="en-US" altLang="ko-KR" dirty="0"/>
+              <a:t>.x = 10;`</a:t>
             </a:r>
           </a:p>
           <a:p>
@@ -7764,6 +7788,738 @@
           <p:cNvPr id="2" name="제목 1">
             <a:extLst>
               <a:ext uri="{FF2B5EF4-FFF2-40B4-BE49-F238E27FC236}">
+                <a16:creationId xmlns:a16="http://schemas.microsoft.com/office/drawing/2014/main" id="{1B8348A3-ADC4-499F-8A1D-A895DF9FF598}"/>
+              </a:ext>
+            </a:extLst>
+          </p:cNvPr>
+          <p:cNvSpPr>
+            <a:spLocks noGrp="1"/>
+          </p:cNvSpPr>
+          <p:nvPr>
+            <p:ph type="title"/>
+          </p:nvPr>
+        </p:nvSpPr>
+        <p:spPr/>
+        <p:txBody>
+          <a:bodyPr/>
+          <a:lstStyle/>
+          <a:p>
+            <a:r>
+              <a:rPr lang="en-US" altLang="ko-KR" dirty="0" err="1"/>
+              <a:t>deltaTime</a:t>
+            </a:r>
+            <a:r>
+              <a:rPr lang="en-US" altLang="ko-KR" dirty="0"/>
+              <a:t> </a:t>
+            </a:r>
+            <a:r>
+              <a:rPr lang="ko-KR" altLang="en-US" dirty="0"/>
+              <a:t>곱하기</a:t>
+            </a:r>
+          </a:p>
+        </p:txBody>
+      </p:sp>
+      <mc:AlternateContent xmlns:mc="http://schemas.openxmlformats.org/markup-compatibility/2006" xmlns:a14="http://schemas.microsoft.com/office/drawing/2010/main">
+        <mc:Choice Requires="a14">
+          <p:sp>
+            <p:nvSpPr>
+              <p:cNvPr id="3" name="내용 개체 틀 2">
+                <a:extLst>
+                  <a:ext uri="{FF2B5EF4-FFF2-40B4-BE49-F238E27FC236}">
+                    <a16:creationId xmlns:a16="http://schemas.microsoft.com/office/drawing/2014/main" id="{94A7BB06-9FEF-4346-98C7-0695B41C5CA9}"/>
+                  </a:ext>
+                </a:extLst>
+              </p:cNvPr>
+              <p:cNvSpPr>
+                <a:spLocks noGrp="1"/>
+              </p:cNvSpPr>
+              <p:nvPr>
+                <p:ph idx="1"/>
+              </p:nvPr>
+            </p:nvSpPr>
+            <p:spPr/>
+            <p:txBody>
+              <a:bodyPr/>
+              <a:lstStyle/>
+              <a:p>
+                <a:pPr marL="0" indent="0">
+                  <a:buNone/>
+                </a:pPr>
+                <a:r>
+                  <a:rPr lang="en-US" altLang="ko-KR" dirty="0" err="1">
+                    <a:latin typeface="Cambria Math" panose="02040503050406030204" pitchFamily="18" charset="0"/>
+                  </a:rPr>
+                  <a:t>deltaTime</a:t>
+                </a:r>
+                <a:r>
+                  <a:rPr lang="ko-KR" altLang="en-US" dirty="0">
+                    <a:latin typeface="Cambria Math" panose="02040503050406030204" pitchFamily="18" charset="0"/>
+                  </a:rPr>
+                  <a:t>을 곱하면 주기적으로 같아지는 시점이 존재하게 된다</a:t>
+                </a:r>
+                <a:r>
+                  <a:rPr lang="en-US" altLang="ko-KR" dirty="0">
+                    <a:latin typeface="Cambria Math" panose="02040503050406030204" pitchFamily="18" charset="0"/>
+                  </a:rPr>
+                  <a:t>.</a:t>
+                </a:r>
+              </a:p>
+              <a:p>
+                <a14:m>
+                  <m:oMath xmlns:m="http://schemas.openxmlformats.org/officeDocument/2006/math">
+                    <m:nary>
+                      <m:naryPr>
+                        <m:chr m:val="∑"/>
+                        <m:ctrlPr>
+                          <a:rPr lang="ko-KR" altLang="en-US" i="1" smtClean="0">
+                            <a:latin typeface="Cambria Math" panose="02040503050406030204" pitchFamily="18" charset="0"/>
+                          </a:rPr>
+                        </m:ctrlPr>
+                      </m:naryPr>
+                      <m:sub>
+                        <m:r>
+                          <m:rPr>
+                            <m:brk m:alnAt="23"/>
+                          </m:rPr>
+                          <a:rPr lang="en-US" altLang="ko-KR" b="0" i="1" smtClean="0">
+                            <a:latin typeface="Cambria Math" panose="02040503050406030204" pitchFamily="18" charset="0"/>
+                          </a:rPr>
+                          <m:t>1</m:t>
+                        </m:r>
+                      </m:sub>
+                      <m:sup>
+                        <m:r>
+                          <a:rPr lang="en-US" altLang="ko-KR" b="0" i="1" smtClean="0">
+                            <a:latin typeface="Cambria Math" panose="02040503050406030204" pitchFamily="18" charset="0"/>
+                          </a:rPr>
+                          <m:t>𝐹𝑃𝑆</m:t>
+                        </m:r>
+                      </m:sup>
+                      <m:e>
+                        <m:r>
+                          <a:rPr lang="en-US" altLang="ko-KR" b="0" i="1" smtClean="0">
+                            <a:latin typeface="Cambria Math" panose="02040503050406030204" pitchFamily="18" charset="0"/>
+                          </a:rPr>
+                          <m:t>1=</m:t>
+                        </m:r>
+                        <m:r>
+                          <a:rPr lang="en-US" altLang="ko-KR" b="0" i="1" smtClean="0">
+                            <a:latin typeface="Cambria Math" panose="02040503050406030204" pitchFamily="18" charset="0"/>
+                          </a:rPr>
+                          <m:t>𝐹𝑃𝑆</m:t>
+                        </m:r>
+                      </m:e>
+                    </m:nary>
+                  </m:oMath>
+                </a14:m>
+                <a:endParaRPr lang="en-US" altLang="ko-KR" dirty="0"/>
+              </a:p>
+              <a:p>
+                <a14:m>
+                  <m:oMath xmlns:m="http://schemas.openxmlformats.org/officeDocument/2006/math">
+                    <m:nary>
+                      <m:naryPr>
+                        <m:chr m:val="∑"/>
+                        <m:ctrlPr>
+                          <a:rPr lang="ko-KR" altLang="en-US" i="1">
+                            <a:latin typeface="Cambria Math" panose="02040503050406030204" pitchFamily="18" charset="0"/>
+                          </a:rPr>
+                        </m:ctrlPr>
+                      </m:naryPr>
+                      <m:sub>
+                        <m:r>
+                          <m:rPr>
+                            <m:brk m:alnAt="23"/>
+                          </m:rPr>
+                          <a:rPr lang="en-US" altLang="ko-KR" i="1">
+                            <a:latin typeface="Cambria Math" panose="02040503050406030204" pitchFamily="18" charset="0"/>
+                          </a:rPr>
+                          <m:t>1</m:t>
+                        </m:r>
+                      </m:sub>
+                      <m:sup>
+                        <m:r>
+                          <a:rPr lang="en-US" altLang="ko-KR" i="1">
+                            <a:latin typeface="Cambria Math" panose="02040503050406030204" pitchFamily="18" charset="0"/>
+                          </a:rPr>
+                          <m:t>𝐹𝑃𝑆</m:t>
+                        </m:r>
+                      </m:sup>
+                      <m:e>
+                        <m:r>
+                          <a:rPr lang="en-US" altLang="ko-KR" i="1">
+                            <a:latin typeface="Cambria Math" panose="02040503050406030204" pitchFamily="18" charset="0"/>
+                          </a:rPr>
+                          <m:t>1</m:t>
+                        </m:r>
+                        <m:r>
+                          <a:rPr lang="en-US" altLang="ko-KR" b="0" i="1" smtClean="0">
+                            <a:latin typeface="Cambria Math" panose="02040503050406030204" pitchFamily="18" charset="0"/>
+                          </a:rPr>
+                          <m:t>∗ </m:t>
+                        </m:r>
+                        <m:r>
+                          <a:rPr lang="en-US" altLang="ko-KR" b="0" i="1" smtClean="0">
+                            <a:latin typeface="Cambria Math" panose="02040503050406030204" pitchFamily="18" charset="0"/>
+                            <a:ea typeface="Cambria Math" panose="02040503050406030204" pitchFamily="18" charset="0"/>
+                          </a:rPr>
+                          <m:t>∆</m:t>
+                        </m:r>
+                        <m:r>
+                          <a:rPr lang="en-US" altLang="ko-KR" b="0" i="1" smtClean="0">
+                            <a:latin typeface="Cambria Math" panose="02040503050406030204" pitchFamily="18" charset="0"/>
+                            <a:ea typeface="Cambria Math" panose="02040503050406030204" pitchFamily="18" charset="0"/>
+                          </a:rPr>
+                          <m:t>𝑡𝑖𝑚𝑒</m:t>
+                        </m:r>
+                        <m:r>
+                          <a:rPr lang="en-US" altLang="ko-KR" i="1">
+                            <a:latin typeface="Cambria Math" panose="02040503050406030204" pitchFamily="18" charset="0"/>
+                          </a:rPr>
+                          <m:t>=</m:t>
+                        </m:r>
+                        <m:r>
+                          <a:rPr lang="en-US" altLang="ko-KR" b="0" i="1" smtClean="0">
+                            <a:latin typeface="Cambria Math" panose="02040503050406030204" pitchFamily="18" charset="0"/>
+                          </a:rPr>
+                          <m:t>1</m:t>
+                        </m:r>
+                      </m:e>
+                    </m:nary>
+                  </m:oMath>
+                </a14:m>
+                <a:endParaRPr lang="en-US" altLang="ko-KR" dirty="0"/>
+              </a:p>
+              <a:p>
+                <a:r>
+                  <a:rPr lang="en-US" altLang="ko-KR" dirty="0"/>
+                  <a:t>4</a:t>
+                </a:r>
+              </a:p>
+              <a:p>
+                <a:endParaRPr lang="en-US" altLang="ko-KR" dirty="0"/>
+              </a:p>
+              <a:p>
+                <a:endParaRPr lang="en-US" altLang="ko-KR" dirty="0"/>
+              </a:p>
+              <a:p>
+                <a:r>
+                  <a:rPr lang="en-US" altLang="ko-KR" dirty="0"/>
+                  <a:t>8</a:t>
+                </a:r>
+              </a:p>
+            </p:txBody>
+          </p:sp>
+        </mc:Choice>
+        <mc:Fallback xmlns="">
+          <p:sp>
+            <p:nvSpPr>
+              <p:cNvPr id="3" name="내용 개체 틀 2">
+                <a:extLst>
+                  <a:ext uri="{FF2B5EF4-FFF2-40B4-BE49-F238E27FC236}">
+                    <a16:creationId xmlns:a16="http://schemas.microsoft.com/office/drawing/2014/main" id="{94A7BB06-9FEF-4346-98C7-0695B41C5CA9}"/>
+                  </a:ext>
+                </a:extLst>
+              </p:cNvPr>
+              <p:cNvSpPr>
+                <a:spLocks noGrp="1" noRot="1" noChangeAspect="1" noMove="1" noResize="1" noEditPoints="1" noAdjustHandles="1" noChangeArrowheads="1" noChangeShapeType="1" noTextEdit="1"/>
+              </p:cNvSpPr>
+              <p:nvPr>
+                <p:ph idx="1"/>
+              </p:nvPr>
+            </p:nvSpPr>
+            <p:spPr>
+              <a:blipFill>
+                <a:blip r:embed="rId2"/>
+                <a:stretch>
+                  <a:fillRect l="-2363" t="-1261"/>
+                </a:stretch>
+              </a:blipFill>
+            </p:spPr>
+            <p:txBody>
+              <a:bodyPr/>
+              <a:lstStyle/>
+              <a:p>
+                <a:r>
+                  <a:rPr lang="ko-KR" altLang="en-US">
+                    <a:noFill/>
+                  </a:rPr>
+                  <a:t> </a:t>
+                </a:r>
+              </a:p>
+            </p:txBody>
+          </p:sp>
+        </mc:Fallback>
+      </mc:AlternateContent>
+      <p:cxnSp>
+        <p:nvCxnSpPr>
+          <p:cNvPr id="5" name="직선 연결선 4">
+            <a:extLst>
+              <a:ext uri="{FF2B5EF4-FFF2-40B4-BE49-F238E27FC236}">
+                <a16:creationId xmlns:a16="http://schemas.microsoft.com/office/drawing/2014/main" id="{70D313B8-C917-41E9-A33F-A03B81B215EE}"/>
+              </a:ext>
+            </a:extLst>
+          </p:cNvPr>
+          <p:cNvCxnSpPr/>
+          <p:nvPr/>
+        </p:nvCxnSpPr>
+        <p:spPr>
+          <a:xfrm>
+            <a:off x="946404" y="3717032"/>
+            <a:ext cx="6073868" cy="0"/>
+          </a:xfrm>
+          <a:prstGeom prst="line">
+            <a:avLst/>
+          </a:prstGeom>
+          <a:ln w="38100"/>
+        </p:spPr>
+        <p:style>
+          <a:lnRef idx="1">
+            <a:schemeClr val="accent1"/>
+          </a:lnRef>
+          <a:fillRef idx="0">
+            <a:schemeClr val="accent1"/>
+          </a:fillRef>
+          <a:effectRef idx="0">
+            <a:schemeClr val="accent1"/>
+          </a:effectRef>
+          <a:fontRef idx="minor">
+            <a:schemeClr val="tx1"/>
+          </a:fontRef>
+        </p:style>
+      </p:cxnSp>
+      <p:cxnSp>
+        <p:nvCxnSpPr>
+          <p:cNvPr id="6" name="직선 연결선 5">
+            <a:extLst>
+              <a:ext uri="{FF2B5EF4-FFF2-40B4-BE49-F238E27FC236}">
+                <a16:creationId xmlns:a16="http://schemas.microsoft.com/office/drawing/2014/main" id="{9280A53C-3A28-4198-9E68-FF18255F880E}"/>
+              </a:ext>
+            </a:extLst>
+          </p:cNvPr>
+          <p:cNvCxnSpPr/>
+          <p:nvPr/>
+        </p:nvCxnSpPr>
+        <p:spPr>
+          <a:xfrm>
+            <a:off x="946404" y="4941168"/>
+            <a:ext cx="6073868" cy="0"/>
+          </a:xfrm>
+          <a:prstGeom prst="line">
+            <a:avLst/>
+          </a:prstGeom>
+          <a:ln w="38100"/>
+        </p:spPr>
+        <p:style>
+          <a:lnRef idx="1">
+            <a:schemeClr val="accent1"/>
+          </a:lnRef>
+          <a:fillRef idx="0">
+            <a:schemeClr val="accent1"/>
+          </a:fillRef>
+          <a:effectRef idx="0">
+            <a:schemeClr val="accent1"/>
+          </a:effectRef>
+          <a:fontRef idx="minor">
+            <a:schemeClr val="tx1"/>
+          </a:fontRef>
+        </p:style>
+      </p:cxnSp>
+      <p:cxnSp>
+        <p:nvCxnSpPr>
+          <p:cNvPr id="8" name="직선 연결선 7">
+            <a:extLst>
+              <a:ext uri="{FF2B5EF4-FFF2-40B4-BE49-F238E27FC236}">
+                <a16:creationId xmlns:a16="http://schemas.microsoft.com/office/drawing/2014/main" id="{EC0041AE-8796-4080-B638-F985A9B544B7}"/>
+              </a:ext>
+            </a:extLst>
+          </p:cNvPr>
+          <p:cNvCxnSpPr/>
+          <p:nvPr/>
+        </p:nvCxnSpPr>
+        <p:spPr>
+          <a:xfrm>
+            <a:off x="3923928" y="3537012"/>
+            <a:ext cx="0" cy="360040"/>
+          </a:xfrm>
+          <a:prstGeom prst="line">
+            <a:avLst/>
+          </a:prstGeom>
+        </p:spPr>
+        <p:style>
+          <a:lnRef idx="1">
+            <a:schemeClr val="accent1"/>
+          </a:lnRef>
+          <a:fillRef idx="0">
+            <a:schemeClr val="accent1"/>
+          </a:fillRef>
+          <a:effectRef idx="0">
+            <a:schemeClr val="accent1"/>
+          </a:effectRef>
+          <a:fontRef idx="minor">
+            <a:schemeClr val="tx1"/>
+          </a:fontRef>
+        </p:style>
+      </p:cxnSp>
+      <p:cxnSp>
+        <p:nvCxnSpPr>
+          <p:cNvPr id="13" name="직선 연결선 12">
+            <a:extLst>
+              <a:ext uri="{FF2B5EF4-FFF2-40B4-BE49-F238E27FC236}">
+                <a16:creationId xmlns:a16="http://schemas.microsoft.com/office/drawing/2014/main" id="{779255BF-6259-40EE-A797-616C1AEB96C5}"/>
+              </a:ext>
+            </a:extLst>
+          </p:cNvPr>
+          <p:cNvCxnSpPr/>
+          <p:nvPr/>
+        </p:nvCxnSpPr>
+        <p:spPr>
+          <a:xfrm>
+            <a:off x="5652120" y="3537012"/>
+            <a:ext cx="0" cy="360040"/>
+          </a:xfrm>
+          <a:prstGeom prst="line">
+            <a:avLst/>
+          </a:prstGeom>
+        </p:spPr>
+        <p:style>
+          <a:lnRef idx="1">
+            <a:schemeClr val="accent1"/>
+          </a:lnRef>
+          <a:fillRef idx="0">
+            <a:schemeClr val="accent1"/>
+          </a:fillRef>
+          <a:effectRef idx="0">
+            <a:schemeClr val="accent1"/>
+          </a:effectRef>
+          <a:fontRef idx="minor">
+            <a:schemeClr val="tx1"/>
+          </a:fontRef>
+        </p:style>
+      </p:cxnSp>
+      <p:cxnSp>
+        <p:nvCxnSpPr>
+          <p:cNvPr id="14" name="직선 연결선 13">
+            <a:extLst>
+              <a:ext uri="{FF2B5EF4-FFF2-40B4-BE49-F238E27FC236}">
+                <a16:creationId xmlns:a16="http://schemas.microsoft.com/office/drawing/2014/main" id="{7A3C6936-EEE5-4D6E-B4D1-43D71FA56E27}"/>
+              </a:ext>
+            </a:extLst>
+          </p:cNvPr>
+          <p:cNvCxnSpPr/>
+          <p:nvPr/>
+        </p:nvCxnSpPr>
+        <p:spPr>
+          <a:xfrm>
+            <a:off x="2267744" y="3537012"/>
+            <a:ext cx="0" cy="360040"/>
+          </a:xfrm>
+          <a:prstGeom prst="line">
+            <a:avLst/>
+          </a:prstGeom>
+        </p:spPr>
+        <p:style>
+          <a:lnRef idx="1">
+            <a:schemeClr val="accent1"/>
+          </a:lnRef>
+          <a:fillRef idx="0">
+            <a:schemeClr val="accent1"/>
+          </a:fillRef>
+          <a:effectRef idx="0">
+            <a:schemeClr val="accent1"/>
+          </a:effectRef>
+          <a:fontRef idx="minor">
+            <a:schemeClr val="tx1"/>
+          </a:fontRef>
+        </p:style>
+      </p:cxnSp>
+      <p:cxnSp>
+        <p:nvCxnSpPr>
+          <p:cNvPr id="20" name="직선 연결선 19">
+            <a:extLst>
+              <a:ext uri="{FF2B5EF4-FFF2-40B4-BE49-F238E27FC236}">
+                <a16:creationId xmlns:a16="http://schemas.microsoft.com/office/drawing/2014/main" id="{1EB33415-D029-4BF9-A7B6-16BFCE57C6DA}"/>
+              </a:ext>
+            </a:extLst>
+          </p:cNvPr>
+          <p:cNvCxnSpPr/>
+          <p:nvPr/>
+        </p:nvCxnSpPr>
+        <p:spPr>
+          <a:xfrm>
+            <a:off x="3946808" y="4761148"/>
+            <a:ext cx="0" cy="360040"/>
+          </a:xfrm>
+          <a:prstGeom prst="line">
+            <a:avLst/>
+          </a:prstGeom>
+        </p:spPr>
+        <p:style>
+          <a:lnRef idx="1">
+            <a:schemeClr val="accent1"/>
+          </a:lnRef>
+          <a:fillRef idx="0">
+            <a:schemeClr val="accent1"/>
+          </a:fillRef>
+          <a:effectRef idx="0">
+            <a:schemeClr val="accent1"/>
+          </a:effectRef>
+          <a:fontRef idx="minor">
+            <a:schemeClr val="tx1"/>
+          </a:fontRef>
+        </p:style>
+      </p:cxnSp>
+      <p:cxnSp>
+        <p:nvCxnSpPr>
+          <p:cNvPr id="21" name="직선 연결선 20">
+            <a:extLst>
+              <a:ext uri="{FF2B5EF4-FFF2-40B4-BE49-F238E27FC236}">
+                <a16:creationId xmlns:a16="http://schemas.microsoft.com/office/drawing/2014/main" id="{5B640D5A-C913-4916-B497-5E0EE279916E}"/>
+              </a:ext>
+            </a:extLst>
+          </p:cNvPr>
+          <p:cNvCxnSpPr/>
+          <p:nvPr/>
+        </p:nvCxnSpPr>
+        <p:spPr>
+          <a:xfrm>
+            <a:off x="5675000" y="4761148"/>
+            <a:ext cx="0" cy="360040"/>
+          </a:xfrm>
+          <a:prstGeom prst="line">
+            <a:avLst/>
+          </a:prstGeom>
+        </p:spPr>
+        <p:style>
+          <a:lnRef idx="1">
+            <a:schemeClr val="accent1"/>
+          </a:lnRef>
+          <a:fillRef idx="0">
+            <a:schemeClr val="accent1"/>
+          </a:fillRef>
+          <a:effectRef idx="0">
+            <a:schemeClr val="accent1"/>
+          </a:effectRef>
+          <a:fontRef idx="minor">
+            <a:schemeClr val="tx1"/>
+          </a:fontRef>
+        </p:style>
+      </p:cxnSp>
+      <p:cxnSp>
+        <p:nvCxnSpPr>
+          <p:cNvPr id="22" name="직선 연결선 21">
+            <a:extLst>
+              <a:ext uri="{FF2B5EF4-FFF2-40B4-BE49-F238E27FC236}">
+                <a16:creationId xmlns:a16="http://schemas.microsoft.com/office/drawing/2014/main" id="{FB267202-F29E-48BD-9BCB-422AEB51C00F}"/>
+              </a:ext>
+            </a:extLst>
+          </p:cNvPr>
+          <p:cNvCxnSpPr/>
+          <p:nvPr/>
+        </p:nvCxnSpPr>
+        <p:spPr>
+          <a:xfrm>
+            <a:off x="2290624" y="4761148"/>
+            <a:ext cx="0" cy="360040"/>
+          </a:xfrm>
+          <a:prstGeom prst="line">
+            <a:avLst/>
+          </a:prstGeom>
+        </p:spPr>
+        <p:style>
+          <a:lnRef idx="1">
+            <a:schemeClr val="accent1"/>
+          </a:lnRef>
+          <a:fillRef idx="0">
+            <a:schemeClr val="accent1"/>
+          </a:fillRef>
+          <a:effectRef idx="0">
+            <a:schemeClr val="accent1"/>
+          </a:effectRef>
+          <a:fontRef idx="minor">
+            <a:schemeClr val="tx1"/>
+          </a:fontRef>
+        </p:style>
+      </p:cxnSp>
+      <p:cxnSp>
+        <p:nvCxnSpPr>
+          <p:cNvPr id="23" name="직선 연결선 22">
+            <a:extLst>
+              <a:ext uri="{FF2B5EF4-FFF2-40B4-BE49-F238E27FC236}">
+                <a16:creationId xmlns:a16="http://schemas.microsoft.com/office/drawing/2014/main" id="{D1DB2120-4009-49B0-968B-E85556CCFC36}"/>
+              </a:ext>
+            </a:extLst>
+          </p:cNvPr>
+          <p:cNvCxnSpPr/>
+          <p:nvPr/>
+        </p:nvCxnSpPr>
+        <p:spPr>
+          <a:xfrm>
+            <a:off x="3147080" y="4761148"/>
+            <a:ext cx="0" cy="360040"/>
+          </a:xfrm>
+          <a:prstGeom prst="line">
+            <a:avLst/>
+          </a:prstGeom>
+        </p:spPr>
+        <p:style>
+          <a:lnRef idx="1">
+            <a:schemeClr val="accent1"/>
+          </a:lnRef>
+          <a:fillRef idx="0">
+            <a:schemeClr val="accent1"/>
+          </a:fillRef>
+          <a:effectRef idx="0">
+            <a:schemeClr val="accent1"/>
+          </a:effectRef>
+          <a:fontRef idx="minor">
+            <a:schemeClr val="tx1"/>
+          </a:fontRef>
+        </p:style>
+      </p:cxnSp>
+      <p:cxnSp>
+        <p:nvCxnSpPr>
+          <p:cNvPr id="24" name="직선 연결선 23">
+            <a:extLst>
+              <a:ext uri="{FF2B5EF4-FFF2-40B4-BE49-F238E27FC236}">
+                <a16:creationId xmlns:a16="http://schemas.microsoft.com/office/drawing/2014/main" id="{739C526B-EC90-42DA-9C98-CC9084A53716}"/>
+              </a:ext>
+            </a:extLst>
+          </p:cNvPr>
+          <p:cNvCxnSpPr/>
+          <p:nvPr/>
+        </p:nvCxnSpPr>
+        <p:spPr>
+          <a:xfrm>
+            <a:off x="4875272" y="4761148"/>
+            <a:ext cx="0" cy="360040"/>
+          </a:xfrm>
+          <a:prstGeom prst="line">
+            <a:avLst/>
+          </a:prstGeom>
+        </p:spPr>
+        <p:style>
+          <a:lnRef idx="1">
+            <a:schemeClr val="accent1"/>
+          </a:lnRef>
+          <a:fillRef idx="0">
+            <a:schemeClr val="accent1"/>
+          </a:fillRef>
+          <a:effectRef idx="0">
+            <a:schemeClr val="accent1"/>
+          </a:effectRef>
+          <a:fontRef idx="minor">
+            <a:schemeClr val="tx1"/>
+          </a:fontRef>
+        </p:style>
+      </p:cxnSp>
+      <p:cxnSp>
+        <p:nvCxnSpPr>
+          <p:cNvPr id="25" name="직선 연결선 24">
+            <a:extLst>
+              <a:ext uri="{FF2B5EF4-FFF2-40B4-BE49-F238E27FC236}">
+                <a16:creationId xmlns:a16="http://schemas.microsoft.com/office/drawing/2014/main" id="{9F977A2A-C9C0-4498-A5AA-1A75F151C4C3}"/>
+              </a:ext>
+            </a:extLst>
+          </p:cNvPr>
+          <p:cNvCxnSpPr/>
+          <p:nvPr/>
+        </p:nvCxnSpPr>
+        <p:spPr>
+          <a:xfrm>
+            <a:off x="1490896" y="4761148"/>
+            <a:ext cx="0" cy="360040"/>
+          </a:xfrm>
+          <a:prstGeom prst="line">
+            <a:avLst/>
+          </a:prstGeom>
+        </p:spPr>
+        <p:style>
+          <a:lnRef idx="1">
+            <a:schemeClr val="accent1"/>
+          </a:lnRef>
+          <a:fillRef idx="0">
+            <a:schemeClr val="accent1"/>
+          </a:fillRef>
+          <a:effectRef idx="0">
+            <a:schemeClr val="accent1"/>
+          </a:effectRef>
+          <a:fontRef idx="minor">
+            <a:schemeClr val="tx1"/>
+          </a:fontRef>
+        </p:style>
+      </p:cxnSp>
+      <p:cxnSp>
+        <p:nvCxnSpPr>
+          <p:cNvPr id="26" name="직선 연결선 25">
+            <a:extLst>
+              <a:ext uri="{FF2B5EF4-FFF2-40B4-BE49-F238E27FC236}">
+                <a16:creationId xmlns:a16="http://schemas.microsoft.com/office/drawing/2014/main" id="{992DC012-B35F-4123-BB44-85C13A048EA0}"/>
+              </a:ext>
+            </a:extLst>
+          </p:cNvPr>
+          <p:cNvCxnSpPr/>
+          <p:nvPr/>
+        </p:nvCxnSpPr>
+        <p:spPr>
+          <a:xfrm>
+            <a:off x="6459448" y="4761148"/>
+            <a:ext cx="0" cy="360040"/>
+          </a:xfrm>
+          <a:prstGeom prst="line">
+            <a:avLst/>
+          </a:prstGeom>
+        </p:spPr>
+        <p:style>
+          <a:lnRef idx="1">
+            <a:schemeClr val="accent1"/>
+          </a:lnRef>
+          <a:fillRef idx="0">
+            <a:schemeClr val="accent1"/>
+          </a:fillRef>
+          <a:effectRef idx="0">
+            <a:schemeClr val="accent1"/>
+          </a:effectRef>
+          <a:fontRef idx="minor">
+            <a:schemeClr val="tx1"/>
+          </a:fontRef>
+        </p:style>
+      </p:cxnSp>
+    </p:spTree>
+    <p:extLst>
+      <p:ext uri="{BB962C8B-B14F-4D97-AF65-F5344CB8AC3E}">
+        <p14:creationId xmlns:p14="http://schemas.microsoft.com/office/powerpoint/2010/main" val="4127306669"/>
+      </p:ext>
+    </p:extLst>
+  </p:cSld>
+  <p:clrMapOvr>
+    <a:masterClrMapping/>
+  </p:clrMapOvr>
+</p:sld>
+</file>
+
+<file path=ppt/slides/slide25.xml><?xml version="1.0" encoding="utf-8"?>
+<p:sld xmlns:a="http://schemas.openxmlformats.org/drawingml/2006/main" xmlns:r="http://schemas.openxmlformats.org/officeDocument/2006/relationships" xmlns:p="http://schemas.openxmlformats.org/presentationml/2006/main">
+  <p:cSld>
+    <p:spTree>
+      <p:nvGrpSpPr>
+        <p:cNvPr id="1" name=""/>
+        <p:cNvGrpSpPr/>
+        <p:nvPr/>
+      </p:nvGrpSpPr>
+      <p:grpSpPr>
+        <a:xfrm>
+          <a:off x="0" y="0"/>
+          <a:ext cx="0" cy="0"/>
+          <a:chOff x="0" y="0"/>
+          <a:chExt cx="0" cy="0"/>
+        </a:xfrm>
+      </p:grpSpPr>
+      <p:sp>
+        <p:nvSpPr>
+          <p:cNvPr id="2" name="제목 1">
+            <a:extLst>
+              <a:ext uri="{FF2B5EF4-FFF2-40B4-BE49-F238E27FC236}">
                 <a16:creationId xmlns:a16="http://schemas.microsoft.com/office/drawing/2014/main" id="{33097BCF-A653-4CB0-997E-82241E28D4FC}"/>
               </a:ext>
             </a:extLst>
@@ -7896,148 +8652,6 @@
 </p:sld>
 </file>
 
-<file path=ppt/slides/slide25.xml><?xml version="1.0" encoding="utf-8"?>
-<p:sld xmlns:a="http://schemas.openxmlformats.org/drawingml/2006/main" xmlns:r="http://schemas.openxmlformats.org/officeDocument/2006/relationships" xmlns:p="http://schemas.openxmlformats.org/presentationml/2006/main">
-  <p:cSld>
-    <p:spTree>
-      <p:nvGrpSpPr>
-        <p:cNvPr id="1" name=""/>
-        <p:cNvGrpSpPr/>
-        <p:nvPr/>
-      </p:nvGrpSpPr>
-      <p:grpSpPr>
-        <a:xfrm>
-          <a:off x="0" y="0"/>
-          <a:ext cx="0" cy="0"/>
-          <a:chOff x="0" y="0"/>
-          <a:chExt cx="0" cy="0"/>
-        </a:xfrm>
-      </p:grpSpPr>
-      <p:sp>
-        <p:nvSpPr>
-          <p:cNvPr id="2" name="제목 1">
-            <a:extLst>
-              <a:ext uri="{FF2B5EF4-FFF2-40B4-BE49-F238E27FC236}">
-                <a16:creationId xmlns:a16="http://schemas.microsoft.com/office/drawing/2014/main" id="{8834DAB4-1B24-416D-B213-997E062FE2DF}"/>
-              </a:ext>
-            </a:extLst>
-          </p:cNvPr>
-          <p:cNvSpPr>
-            <a:spLocks noGrp="1"/>
-          </p:cNvSpPr>
-          <p:nvPr>
-            <p:ph type="title"/>
-          </p:nvPr>
-        </p:nvSpPr>
-        <p:spPr/>
-        <p:txBody>
-          <a:bodyPr/>
-          <a:lstStyle/>
-          <a:p>
-            <a:r>
-              <a:rPr lang="ko-KR" altLang="en-US" dirty="0"/>
-              <a:t>위치</a:t>
-            </a:r>
-          </a:p>
-        </p:txBody>
-      </p:sp>
-      <p:sp>
-        <p:nvSpPr>
-          <p:cNvPr id="3" name="내용 개체 틀 2">
-            <a:extLst>
-              <a:ext uri="{FF2B5EF4-FFF2-40B4-BE49-F238E27FC236}">
-                <a16:creationId xmlns:a16="http://schemas.microsoft.com/office/drawing/2014/main" id="{B586A472-039E-4488-96BE-57EAAD959464}"/>
-              </a:ext>
-            </a:extLst>
-          </p:cNvPr>
-          <p:cNvSpPr>
-            <a:spLocks noGrp="1"/>
-          </p:cNvSpPr>
-          <p:nvPr>
-            <p:ph idx="1"/>
-          </p:nvPr>
-        </p:nvSpPr>
-        <p:spPr/>
-        <p:txBody>
-          <a:bodyPr/>
-          <a:lstStyle/>
-          <a:p>
-            <a:pPr marL="0" indent="0">
-              <a:buNone/>
-            </a:pPr>
-            <a:r>
-              <a:rPr lang="en-US" altLang="ko-KR" dirty="0"/>
-              <a:t>Local </a:t>
-            </a:r>
-            <a:r>
-              <a:rPr lang="ko-KR" altLang="en-US" dirty="0"/>
-              <a:t>부모</a:t>
-            </a:r>
-            <a:r>
-              <a:rPr lang="en-US" altLang="ko-KR" dirty="0"/>
-              <a:t>-</a:t>
-            </a:r>
-            <a:r>
-              <a:rPr lang="ko-KR" altLang="en-US" dirty="0"/>
-              <a:t>나 사이의 위치</a:t>
-            </a:r>
-            <a:endParaRPr lang="en-US" altLang="ko-KR" dirty="0"/>
-          </a:p>
-          <a:p>
-            <a:r>
-              <a:rPr lang="en-US" altLang="ko-KR" dirty="0" err="1"/>
-              <a:t>transform.localPosition</a:t>
-            </a:r>
-            <a:endParaRPr lang="en-US" altLang="ko-KR" dirty="0"/>
-          </a:p>
-          <a:p>
-            <a:pPr marL="0" indent="0">
-              <a:buNone/>
-            </a:pPr>
-            <a:endParaRPr lang="en-US" altLang="ko-KR" dirty="0"/>
-          </a:p>
-          <a:p>
-            <a:pPr marL="0" indent="0">
-              <a:buNone/>
-            </a:pPr>
-            <a:r>
-              <a:rPr lang="en-US" altLang="ko-KR" dirty="0"/>
-              <a:t>Global </a:t>
-            </a:r>
-            <a:r>
-              <a:rPr lang="ko-KR" altLang="en-US" dirty="0"/>
-              <a:t>월드 기준의 절대적인 위치</a:t>
-            </a:r>
-            <a:endParaRPr lang="en-US" altLang="ko-KR" dirty="0"/>
-          </a:p>
-          <a:p>
-            <a:r>
-              <a:rPr lang="en-US" altLang="ko-KR" dirty="0" err="1"/>
-              <a:t>transform.position</a:t>
-            </a:r>
-            <a:endParaRPr lang="en-US" altLang="ko-KR" dirty="0"/>
-          </a:p>
-          <a:p>
-            <a:pPr marL="0" indent="0">
-              <a:buNone/>
-            </a:pPr>
-            <a:endParaRPr lang="en-US" altLang="ko-KR" dirty="0"/>
-          </a:p>
-        </p:txBody>
-      </p:sp>
-    </p:spTree>
-    <p:extLst>
-      <p:ext uri="{BB962C8B-B14F-4D97-AF65-F5344CB8AC3E}">
-        <p14:creationId xmlns:p14="http://schemas.microsoft.com/office/powerpoint/2010/main" val="303636569"/>
-      </p:ext>
-    </p:extLst>
-  </p:cSld>
-  <p:clrMapOvr>
-    <a:masterClrMapping/>
-  </p:clrMapOvr>
-</p:sld>
-</file>
-
 <file path=ppt/slides/slide26.xml><?xml version="1.0" encoding="utf-8"?>
 <p:sld xmlns:a="http://schemas.openxmlformats.org/drawingml/2006/main" xmlns:r="http://schemas.openxmlformats.org/officeDocument/2006/relationships" xmlns:p="http://schemas.openxmlformats.org/presentationml/2006/main">
   <p:cSld>
@@ -8078,7 +8692,7 @@
           <a:p>
             <a:r>
               <a:rPr lang="ko-KR" altLang="en-US" dirty="0"/>
-              <a:t>이동하기</a:t>
+              <a:t>위치</a:t>
             </a:r>
           </a:p>
         </p:txBody>
@@ -8109,66 +8723,68 @@
             </a:pPr>
             <a:r>
               <a:rPr lang="en-US" altLang="ko-KR" dirty="0"/>
-              <a:t>Local</a:t>
-            </a:r>
+              <a:t>Local </a:t>
+            </a:r>
+            <a:r>
+              <a:rPr lang="ko-KR" altLang="en-US" dirty="0"/>
+              <a:t>부모</a:t>
+            </a:r>
+            <a:r>
+              <a:rPr lang="en-US" altLang="ko-KR" dirty="0"/>
+              <a:t>-</a:t>
+            </a:r>
+            <a:r>
+              <a:rPr lang="ko-KR" altLang="en-US" dirty="0"/>
+              <a:t>나 사이의 위치</a:t>
+            </a:r>
+            <a:endParaRPr lang="en-US" altLang="ko-KR" dirty="0"/>
           </a:p>
           <a:p>
             <a:r>
               <a:rPr lang="en-US" altLang="ko-KR" dirty="0" err="1"/>
-              <a:t>transform.Translate</a:t>
-            </a:r>
-            <a:r>
-              <a:rPr lang="en-US" altLang="ko-KR" dirty="0"/>
-              <a:t>(x, y, z, </a:t>
-            </a:r>
-            <a:r>
-              <a:rPr lang="en-US" altLang="ko-KR" dirty="0" err="1"/>
-              <a:t>Space.Self</a:t>
-            </a:r>
-            <a:r>
-              <a:rPr lang="en-US" altLang="ko-KR" dirty="0"/>
-              <a:t>);</a:t>
-            </a:r>
-          </a:p>
-          <a:p>
+              <a:t>transform.localPosition</a:t>
+            </a:r>
             <a:endParaRPr lang="en-US" altLang="ko-KR" dirty="0"/>
           </a:p>
           <a:p>
             <a:pPr marL="0" indent="0">
               <a:buNone/>
             </a:pPr>
-            <a:r>
-              <a:rPr lang="en-US" altLang="ko-KR" dirty="0"/>
-              <a:t>Global</a:t>
-            </a:r>
+            <a:endParaRPr lang="en-US" altLang="ko-KR" dirty="0"/>
+          </a:p>
+          <a:p>
+            <a:pPr marL="0" indent="0">
+              <a:buNone/>
+            </a:pPr>
+            <a:r>
+              <a:rPr lang="en-US" altLang="ko-KR" dirty="0"/>
+              <a:t>Global </a:t>
+            </a:r>
+            <a:r>
+              <a:rPr lang="ko-KR" altLang="en-US" dirty="0"/>
+              <a:t>월드 기준의 절대적인 위치</a:t>
+            </a:r>
+            <a:endParaRPr lang="en-US" altLang="ko-KR" dirty="0"/>
           </a:p>
           <a:p>
             <a:r>
               <a:rPr lang="en-US" altLang="ko-KR" dirty="0" err="1"/>
-              <a:t>transform.Translate</a:t>
-            </a:r>
-            <a:r>
-              <a:rPr lang="en-US" altLang="ko-KR" dirty="0"/>
-              <a:t>(x, y, z, </a:t>
-            </a:r>
-            <a:r>
-              <a:rPr lang="en-US" altLang="ko-KR" dirty="0" err="1"/>
-              <a:t>Space.World</a:t>
-            </a:r>
-            <a:r>
-              <a:rPr lang="en-US" altLang="ko-KR" dirty="0"/>
-              <a:t>);</a:t>
-            </a:r>
-          </a:p>
-          <a:p>
-            <a:endParaRPr lang="ko-KR" altLang="en-US" dirty="0"/>
+              <a:t>transform.position</a:t>
+            </a:r>
+            <a:endParaRPr lang="en-US" altLang="ko-KR" dirty="0"/>
+          </a:p>
+          <a:p>
+            <a:pPr marL="0" indent="0">
+              <a:buNone/>
+            </a:pPr>
+            <a:endParaRPr lang="en-US" altLang="ko-KR" dirty="0"/>
           </a:p>
         </p:txBody>
       </p:sp>
     </p:spTree>
     <p:extLst>
       <p:ext uri="{BB962C8B-B14F-4D97-AF65-F5344CB8AC3E}">
-        <p14:creationId xmlns:p14="http://schemas.microsoft.com/office/powerpoint/2010/main" val="1985434130"/>
+        <p14:creationId xmlns:p14="http://schemas.microsoft.com/office/powerpoint/2010/main" val="303636569"/>
       </p:ext>
     </p:extLst>
   </p:cSld>
@@ -8200,7 +8816,7 @@
           <p:cNvPr id="2" name="제목 1">
             <a:extLst>
               <a:ext uri="{FF2B5EF4-FFF2-40B4-BE49-F238E27FC236}">
-                <a16:creationId xmlns:a16="http://schemas.microsoft.com/office/drawing/2014/main" id="{6087A5BF-54E3-46F7-B4E8-83927572309D}"/>
+                <a16:creationId xmlns:a16="http://schemas.microsoft.com/office/drawing/2014/main" id="{8834DAB4-1B24-416D-B213-997E062FE2DF}"/>
               </a:ext>
             </a:extLst>
           </p:cNvPr>
@@ -8218,7 +8834,7 @@
           <a:p>
             <a:r>
               <a:rPr lang="ko-KR" altLang="en-US" dirty="0"/>
-              <a:t>속도</a:t>
+              <a:t>이동하기</a:t>
             </a:r>
           </a:p>
         </p:txBody>
@@ -8228,7 +8844,7 @@
           <p:cNvPr id="3" name="내용 개체 틀 2">
             <a:extLst>
               <a:ext uri="{FF2B5EF4-FFF2-40B4-BE49-F238E27FC236}">
-                <a16:creationId xmlns:a16="http://schemas.microsoft.com/office/drawing/2014/main" id="{C02F1C03-DF29-4615-BB69-E407379CDAB3}"/>
+                <a16:creationId xmlns:a16="http://schemas.microsoft.com/office/drawing/2014/main" id="{B586A472-039E-4488-96BE-57EAAD959464}"/>
               </a:ext>
             </a:extLst>
           </p:cNvPr>
@@ -8244,10 +8860,63 @@
           <a:bodyPr/>
           <a:lstStyle/>
           <a:p>
-            <a:r>
-              <a:rPr lang="en-US" altLang="ko-KR" dirty="0"/>
-              <a:t>position += position + velocity;</a:t>
-            </a:r>
+            <a:pPr marL="0" indent="0">
+              <a:buNone/>
+            </a:pPr>
+            <a:r>
+              <a:rPr lang="en-US" altLang="ko-KR" dirty="0"/>
+              <a:t>Local</a:t>
+            </a:r>
+          </a:p>
+          <a:p>
+            <a:r>
+              <a:rPr lang="en-US" altLang="ko-KR" dirty="0" err="1"/>
+              <a:t>transform.Translate</a:t>
+            </a:r>
+            <a:r>
+              <a:rPr lang="en-US" altLang="ko-KR" dirty="0"/>
+              <a:t>(x, y, z, </a:t>
+            </a:r>
+            <a:r>
+              <a:rPr lang="en-US" altLang="ko-KR" dirty="0" err="1"/>
+              <a:t>Space.Self</a:t>
+            </a:r>
+            <a:r>
+              <a:rPr lang="en-US" altLang="ko-KR" dirty="0"/>
+              <a:t>);</a:t>
+            </a:r>
+          </a:p>
+          <a:p>
+            <a:endParaRPr lang="en-US" altLang="ko-KR" dirty="0"/>
+          </a:p>
+          <a:p>
+            <a:pPr marL="0" indent="0">
+              <a:buNone/>
+            </a:pPr>
+            <a:r>
+              <a:rPr lang="en-US" altLang="ko-KR" dirty="0"/>
+              <a:t>Global</a:t>
+            </a:r>
+          </a:p>
+          <a:p>
+            <a:r>
+              <a:rPr lang="en-US" altLang="ko-KR" dirty="0" err="1"/>
+              <a:t>transform.Translate</a:t>
+            </a:r>
+            <a:r>
+              <a:rPr lang="en-US" altLang="ko-KR" dirty="0"/>
+              <a:t>(x, y, z, </a:t>
+            </a:r>
+            <a:r>
+              <a:rPr lang="en-US" altLang="ko-KR" dirty="0" err="1"/>
+              <a:t>Space.World</a:t>
+            </a:r>
+            <a:r>
+              <a:rPr lang="en-US" altLang="ko-KR" dirty="0"/>
+              <a:t>);</a:t>
+            </a:r>
+          </a:p>
+          <a:p>
             <a:endParaRPr lang="ko-KR" altLang="en-US" dirty="0"/>
           </a:p>
         </p:txBody>
@@ -8255,7 +8924,7 @@
     </p:spTree>
     <p:extLst>
       <p:ext uri="{BB962C8B-B14F-4D97-AF65-F5344CB8AC3E}">
-        <p14:creationId xmlns:p14="http://schemas.microsoft.com/office/powerpoint/2010/main" val="3097982689"/>
+        <p14:creationId xmlns:p14="http://schemas.microsoft.com/office/powerpoint/2010/main" val="1985434130"/>
       </p:ext>
     </p:extLst>
   </p:cSld>
@@ -8287,7 +8956,7 @@
           <p:cNvPr id="2" name="제목 1">
             <a:extLst>
               <a:ext uri="{FF2B5EF4-FFF2-40B4-BE49-F238E27FC236}">
-                <a16:creationId xmlns:a16="http://schemas.microsoft.com/office/drawing/2014/main" id="{A2496510-4BAE-4F08-9E97-C8840872B77B}"/>
+                <a16:creationId xmlns:a16="http://schemas.microsoft.com/office/drawing/2014/main" id="{6087A5BF-54E3-46F7-B4E8-83927572309D}"/>
               </a:ext>
             </a:extLst>
           </p:cNvPr>
@@ -8305,7 +8974,7 @@
           <a:p>
             <a:r>
               <a:rPr lang="ko-KR" altLang="en-US" dirty="0"/>
-              <a:t>가속도</a:t>
+              <a:t>속도</a:t>
             </a:r>
           </a:p>
         </p:txBody>
@@ -8315,7 +8984,7 @@
           <p:cNvPr id="3" name="내용 개체 틀 2">
             <a:extLst>
               <a:ext uri="{FF2B5EF4-FFF2-40B4-BE49-F238E27FC236}">
-                <a16:creationId xmlns:a16="http://schemas.microsoft.com/office/drawing/2014/main" id="{A869B699-D8B5-4317-A4AB-95A518162592}"/>
+                <a16:creationId xmlns:a16="http://schemas.microsoft.com/office/drawing/2014/main" id="{C02F1C03-DF29-4615-BB69-E407379CDAB3}"/>
               </a:ext>
             </a:extLst>
           </p:cNvPr>
@@ -8333,17 +9002,8 @@
           <a:p>
             <a:r>
               <a:rPr lang="en-US" altLang="ko-KR" dirty="0"/>
-              <a:t>velocity += velocity + acceleration;</a:t>
-            </a:r>
-          </a:p>
-          <a:p>
-            <a:r>
-              <a:rPr lang="en-US" altLang="ko-KR" dirty="0"/>
               <a:t>position += position + velocity;</a:t>
             </a:r>
-            <a:endParaRPr lang="ko-KR" altLang="en-US" dirty="0"/>
-          </a:p>
-          <a:p>
             <a:endParaRPr lang="ko-KR" altLang="en-US" dirty="0"/>
           </a:p>
         </p:txBody>
@@ -8351,7 +9011,7 @@
     </p:spTree>
     <p:extLst>
       <p:ext uri="{BB962C8B-B14F-4D97-AF65-F5344CB8AC3E}">
-        <p14:creationId xmlns:p14="http://schemas.microsoft.com/office/powerpoint/2010/main" val="91847543"/>
+        <p14:creationId xmlns:p14="http://schemas.microsoft.com/office/powerpoint/2010/main" val="3097982689"/>
       </p:ext>
     </p:extLst>
   </p:cSld>
@@ -8383,7 +9043,7 @@
           <p:cNvPr id="2" name="제목 1">
             <a:extLst>
               <a:ext uri="{FF2B5EF4-FFF2-40B4-BE49-F238E27FC236}">
-                <a16:creationId xmlns:a16="http://schemas.microsoft.com/office/drawing/2014/main" id="{5684A6D3-5352-4640-B710-A27F98F1AA0E}"/>
+                <a16:creationId xmlns:a16="http://schemas.microsoft.com/office/drawing/2014/main" id="{A2496510-4BAE-4F08-9E97-C8840872B77B}"/>
               </a:ext>
             </a:extLst>
           </p:cNvPr>
@@ -8401,7 +9061,7 @@
           <a:p>
             <a:r>
               <a:rPr lang="ko-KR" altLang="en-US" dirty="0"/>
-              <a:t>회전</a:t>
+              <a:t>가속도</a:t>
             </a:r>
           </a:p>
         </p:txBody>
@@ -8411,7 +9071,7 @@
           <p:cNvPr id="3" name="내용 개체 틀 2">
             <a:extLst>
               <a:ext uri="{FF2B5EF4-FFF2-40B4-BE49-F238E27FC236}">
-                <a16:creationId xmlns:a16="http://schemas.microsoft.com/office/drawing/2014/main" id="{1D793416-6383-4728-ACF9-8847DD48AD39}"/>
+                <a16:creationId xmlns:a16="http://schemas.microsoft.com/office/drawing/2014/main" id="{A869B699-D8B5-4317-A4AB-95A518162592}"/>
               </a:ext>
             </a:extLst>
           </p:cNvPr>
@@ -8427,111 +9087,27 @@
           <a:bodyPr/>
           <a:lstStyle/>
           <a:p>
-            <a:pPr marL="0" indent="0">
-              <a:buNone/>
-            </a:pPr>
-            <a:r>
-              <a:rPr lang="en-US" altLang="ko-KR" dirty="0"/>
-              <a:t>Local</a:t>
-            </a:r>
-          </a:p>
-          <a:p>
-            <a:r>
-              <a:rPr lang="en-US" altLang="ko-KR" dirty="0"/>
-              <a:t>Rotate(x</a:t>
-            </a:r>
-            <a:r>
-              <a:rPr lang="ko-KR" altLang="en-US" dirty="0"/>
-              <a:t>축</a:t>
-            </a:r>
-            <a:r>
-              <a:rPr lang="en-US" altLang="ko-KR" dirty="0"/>
-              <a:t>, y</a:t>
-            </a:r>
-            <a:r>
-              <a:rPr lang="ko-KR" altLang="en-US" dirty="0"/>
-              <a:t>축</a:t>
-            </a:r>
-            <a:r>
-              <a:rPr lang="en-US" altLang="ko-KR" dirty="0"/>
-              <a:t>, z</a:t>
-            </a:r>
-            <a:r>
-              <a:rPr lang="ko-KR" altLang="en-US" dirty="0"/>
-              <a:t>축</a:t>
-            </a:r>
-            <a:r>
-              <a:rPr lang="en-US" altLang="ko-KR" dirty="0"/>
-              <a:t>, </a:t>
-            </a:r>
-            <a:r>
-              <a:rPr lang="en-US" altLang="ko-KR" dirty="0" err="1"/>
-              <a:t>Space.Self</a:t>
-            </a:r>
-            <a:r>
-              <a:rPr lang="en-US" altLang="ko-KR" dirty="0"/>
-              <a:t>);</a:t>
-            </a:r>
-          </a:p>
-          <a:p>
-            <a:pPr marL="0" indent="0">
-              <a:buNone/>
-            </a:pPr>
-            <a:endParaRPr lang="en-US" altLang="ko-KR" dirty="0"/>
-          </a:p>
-          <a:p>
-            <a:pPr marL="0" indent="0">
-              <a:buNone/>
-            </a:pPr>
-            <a:r>
-              <a:rPr lang="en-US" altLang="ko-KR" dirty="0"/>
-              <a:t>Global</a:t>
-            </a:r>
-          </a:p>
-          <a:p>
-            <a:r>
-              <a:rPr lang="en-US" altLang="ko-KR" dirty="0"/>
-              <a:t>Rotate(x</a:t>
-            </a:r>
-            <a:r>
-              <a:rPr lang="ko-KR" altLang="en-US" dirty="0"/>
-              <a:t>축</a:t>
-            </a:r>
-            <a:r>
-              <a:rPr lang="en-US" altLang="ko-KR" dirty="0"/>
-              <a:t>, y</a:t>
-            </a:r>
-            <a:r>
-              <a:rPr lang="ko-KR" altLang="en-US" dirty="0"/>
-              <a:t>축</a:t>
-            </a:r>
-            <a:r>
-              <a:rPr lang="en-US" altLang="ko-KR" dirty="0"/>
-              <a:t>, z</a:t>
-            </a:r>
-            <a:r>
-              <a:rPr lang="ko-KR" altLang="en-US" dirty="0"/>
-              <a:t>축</a:t>
-            </a:r>
-            <a:r>
-              <a:rPr lang="en-US" altLang="ko-KR" dirty="0"/>
-              <a:t>, </a:t>
-            </a:r>
-            <a:r>
-              <a:rPr lang="en-US" altLang="ko-KR" dirty="0" err="1"/>
-              <a:t>Space.World</a:t>
-            </a:r>
-            <a:r>
-              <a:rPr lang="en-US" altLang="ko-KR" dirty="0"/>
-              <a:t>);</a:t>
-            </a:r>
+            <a:r>
+              <a:rPr lang="en-US" altLang="ko-KR" dirty="0"/>
+              <a:t>velocity += velocity + acceleration;</a:t>
+            </a:r>
+          </a:p>
+          <a:p>
+            <a:r>
+              <a:rPr lang="en-US" altLang="ko-KR" dirty="0"/>
+              <a:t>position += position + velocity;</a:t>
+            </a:r>
+            <a:endParaRPr lang="ko-KR" altLang="en-US" dirty="0"/>
+          </a:p>
+          <a:p>
+            <a:endParaRPr lang="ko-KR" altLang="en-US" dirty="0"/>
           </a:p>
         </p:txBody>
       </p:sp>
     </p:spTree>
     <p:extLst>
       <p:ext uri="{BB962C8B-B14F-4D97-AF65-F5344CB8AC3E}">
-        <p14:creationId xmlns:p14="http://schemas.microsoft.com/office/powerpoint/2010/main" val="3919831895"/>
+        <p14:creationId xmlns:p14="http://schemas.microsoft.com/office/powerpoint/2010/main" val="91847543"/>
       </p:ext>
     </p:extLst>
   </p:cSld>
@@ -8705,6 +9281,186 @@
           <p:cNvPr id="2" name="제목 1">
             <a:extLst>
               <a:ext uri="{FF2B5EF4-FFF2-40B4-BE49-F238E27FC236}">
+                <a16:creationId xmlns:a16="http://schemas.microsoft.com/office/drawing/2014/main" id="{5684A6D3-5352-4640-B710-A27F98F1AA0E}"/>
+              </a:ext>
+            </a:extLst>
+          </p:cNvPr>
+          <p:cNvSpPr>
+            <a:spLocks noGrp="1"/>
+          </p:cNvSpPr>
+          <p:nvPr>
+            <p:ph type="title"/>
+          </p:nvPr>
+        </p:nvSpPr>
+        <p:spPr/>
+        <p:txBody>
+          <a:bodyPr/>
+          <a:lstStyle/>
+          <a:p>
+            <a:r>
+              <a:rPr lang="ko-KR" altLang="en-US" dirty="0"/>
+              <a:t>회전</a:t>
+            </a:r>
+          </a:p>
+        </p:txBody>
+      </p:sp>
+      <p:sp>
+        <p:nvSpPr>
+          <p:cNvPr id="3" name="내용 개체 틀 2">
+            <a:extLst>
+              <a:ext uri="{FF2B5EF4-FFF2-40B4-BE49-F238E27FC236}">
+                <a16:creationId xmlns:a16="http://schemas.microsoft.com/office/drawing/2014/main" id="{1D793416-6383-4728-ACF9-8847DD48AD39}"/>
+              </a:ext>
+            </a:extLst>
+          </p:cNvPr>
+          <p:cNvSpPr>
+            <a:spLocks noGrp="1"/>
+          </p:cNvSpPr>
+          <p:nvPr>
+            <p:ph idx="1"/>
+          </p:nvPr>
+        </p:nvSpPr>
+        <p:spPr/>
+        <p:txBody>
+          <a:bodyPr/>
+          <a:lstStyle/>
+          <a:p>
+            <a:pPr marL="0" indent="0">
+              <a:buNone/>
+            </a:pPr>
+            <a:r>
+              <a:rPr lang="en-US" altLang="ko-KR" dirty="0"/>
+              <a:t>Local</a:t>
+            </a:r>
+          </a:p>
+          <a:p>
+            <a:r>
+              <a:rPr lang="en-US" altLang="ko-KR" dirty="0"/>
+              <a:t>Rotate(x</a:t>
+            </a:r>
+            <a:r>
+              <a:rPr lang="ko-KR" altLang="en-US" dirty="0"/>
+              <a:t>축</a:t>
+            </a:r>
+            <a:r>
+              <a:rPr lang="en-US" altLang="ko-KR" dirty="0"/>
+              <a:t>, y</a:t>
+            </a:r>
+            <a:r>
+              <a:rPr lang="ko-KR" altLang="en-US" dirty="0"/>
+              <a:t>축</a:t>
+            </a:r>
+            <a:r>
+              <a:rPr lang="en-US" altLang="ko-KR" dirty="0"/>
+              <a:t>, z</a:t>
+            </a:r>
+            <a:r>
+              <a:rPr lang="ko-KR" altLang="en-US" dirty="0"/>
+              <a:t>축</a:t>
+            </a:r>
+            <a:r>
+              <a:rPr lang="en-US" altLang="ko-KR" dirty="0"/>
+              <a:t>, </a:t>
+            </a:r>
+            <a:r>
+              <a:rPr lang="en-US" altLang="ko-KR" dirty="0" err="1"/>
+              <a:t>Space.Self</a:t>
+            </a:r>
+            <a:r>
+              <a:rPr lang="en-US" altLang="ko-KR" dirty="0"/>
+              <a:t>);</a:t>
+            </a:r>
+          </a:p>
+          <a:p>
+            <a:pPr marL="0" indent="0">
+              <a:buNone/>
+            </a:pPr>
+            <a:endParaRPr lang="en-US" altLang="ko-KR" dirty="0"/>
+          </a:p>
+          <a:p>
+            <a:pPr marL="0" indent="0">
+              <a:buNone/>
+            </a:pPr>
+            <a:r>
+              <a:rPr lang="en-US" altLang="ko-KR" dirty="0"/>
+              <a:t>Global</a:t>
+            </a:r>
+          </a:p>
+          <a:p>
+            <a:r>
+              <a:rPr lang="en-US" altLang="ko-KR" dirty="0"/>
+              <a:t>Rotate(x</a:t>
+            </a:r>
+            <a:r>
+              <a:rPr lang="ko-KR" altLang="en-US" dirty="0"/>
+              <a:t>축</a:t>
+            </a:r>
+            <a:r>
+              <a:rPr lang="en-US" altLang="ko-KR" dirty="0"/>
+              <a:t>, y</a:t>
+            </a:r>
+            <a:r>
+              <a:rPr lang="ko-KR" altLang="en-US" dirty="0"/>
+              <a:t>축</a:t>
+            </a:r>
+            <a:r>
+              <a:rPr lang="en-US" altLang="ko-KR" dirty="0"/>
+              <a:t>, z</a:t>
+            </a:r>
+            <a:r>
+              <a:rPr lang="ko-KR" altLang="en-US" dirty="0"/>
+              <a:t>축</a:t>
+            </a:r>
+            <a:r>
+              <a:rPr lang="en-US" altLang="ko-KR" dirty="0"/>
+              <a:t>, </a:t>
+            </a:r>
+            <a:r>
+              <a:rPr lang="en-US" altLang="ko-KR" dirty="0" err="1"/>
+              <a:t>Space.World</a:t>
+            </a:r>
+            <a:r>
+              <a:rPr lang="en-US" altLang="ko-KR" dirty="0"/>
+              <a:t>);</a:t>
+            </a:r>
+          </a:p>
+        </p:txBody>
+      </p:sp>
+    </p:spTree>
+    <p:extLst>
+      <p:ext uri="{BB962C8B-B14F-4D97-AF65-F5344CB8AC3E}">
+        <p14:creationId xmlns:p14="http://schemas.microsoft.com/office/powerpoint/2010/main" val="3919831895"/>
+      </p:ext>
+    </p:extLst>
+  </p:cSld>
+  <p:clrMapOvr>
+    <a:masterClrMapping/>
+  </p:clrMapOvr>
+</p:sld>
+</file>
+
+<file path=ppt/slides/slide31.xml><?xml version="1.0" encoding="utf-8"?>
+<p:sld xmlns:a="http://schemas.openxmlformats.org/drawingml/2006/main" xmlns:r="http://schemas.openxmlformats.org/officeDocument/2006/relationships" xmlns:p="http://schemas.openxmlformats.org/presentationml/2006/main">
+  <p:cSld>
+    <p:spTree>
+      <p:nvGrpSpPr>
+        <p:cNvPr id="1" name=""/>
+        <p:cNvGrpSpPr/>
+        <p:nvPr/>
+      </p:nvGrpSpPr>
+      <p:grpSpPr>
+        <a:xfrm>
+          <a:off x="0" y="0"/>
+          <a:ext cx="0" cy="0"/>
+          <a:chOff x="0" y="0"/>
+          <a:chExt cx="0" cy="0"/>
+        </a:xfrm>
+      </p:grpSpPr>
+      <p:sp>
+        <p:nvSpPr>
+          <p:cNvPr id="2" name="제목 1">
+            <a:extLst>
+              <a:ext uri="{FF2B5EF4-FFF2-40B4-BE49-F238E27FC236}">
                 <a16:creationId xmlns:a16="http://schemas.microsoft.com/office/drawing/2014/main" id="{33097BCF-A653-4CB0-997E-82241E28D4FC}"/>
               </a:ext>
             </a:extLst>
@@ -8881,154 +9637,6 @@
 </p:sld>
 </file>
 
-<file path=ppt/slides/slide31.xml><?xml version="1.0" encoding="utf-8"?>
-<p:sld xmlns:a="http://schemas.openxmlformats.org/drawingml/2006/main" xmlns:r="http://schemas.openxmlformats.org/officeDocument/2006/relationships" xmlns:p="http://schemas.openxmlformats.org/presentationml/2006/main">
-  <p:cSld>
-    <p:spTree>
-      <p:nvGrpSpPr>
-        <p:cNvPr id="1" name=""/>
-        <p:cNvGrpSpPr/>
-        <p:nvPr/>
-      </p:nvGrpSpPr>
-      <p:grpSpPr>
-        <a:xfrm>
-          <a:off x="0" y="0"/>
-          <a:ext cx="0" cy="0"/>
-          <a:chOff x="0" y="0"/>
-          <a:chExt cx="0" cy="0"/>
-        </a:xfrm>
-      </p:grpSpPr>
-      <p:sp>
-        <p:nvSpPr>
-          <p:cNvPr id="2" name="제목 1">
-            <a:extLst>
-              <a:ext uri="{FF2B5EF4-FFF2-40B4-BE49-F238E27FC236}">
-                <a16:creationId xmlns:a16="http://schemas.microsoft.com/office/drawing/2014/main" id="{558B2A02-8350-4AAB-8CCD-8F5A113BEE25}"/>
-              </a:ext>
-            </a:extLst>
-          </p:cNvPr>
-          <p:cNvSpPr>
-            <a:spLocks noGrp="1"/>
-          </p:cNvSpPr>
-          <p:nvPr>
-            <p:ph type="title"/>
-          </p:nvPr>
-        </p:nvSpPr>
-        <p:spPr/>
-        <p:txBody>
-          <a:bodyPr>
-            <a:normAutofit/>
-          </a:bodyPr>
-          <a:lstStyle/>
-          <a:p>
-            <a:r>
-              <a:rPr lang="en-US" altLang="ko-KR" dirty="0"/>
-              <a:t>Asset Store</a:t>
-            </a:r>
-            <a:endParaRPr lang="ko-KR" altLang="en-US" dirty="0"/>
-          </a:p>
-        </p:txBody>
-      </p:sp>
-      <p:sp>
-        <p:nvSpPr>
-          <p:cNvPr id="3" name="내용 개체 틀 2">
-            <a:extLst>
-              <a:ext uri="{FF2B5EF4-FFF2-40B4-BE49-F238E27FC236}">
-                <a16:creationId xmlns:a16="http://schemas.microsoft.com/office/drawing/2014/main" id="{1986919F-9005-44C0-9760-791EEB5FF155}"/>
-              </a:ext>
-            </a:extLst>
-          </p:cNvPr>
-          <p:cNvSpPr>
-            <a:spLocks noGrp="1"/>
-          </p:cNvSpPr>
-          <p:nvPr>
-            <p:ph idx="1"/>
-          </p:nvPr>
-        </p:nvSpPr>
-        <p:spPr/>
-        <p:txBody>
-          <a:bodyPr/>
-          <a:lstStyle/>
-          <a:p>
-            <a:r>
-              <a:rPr lang="ko-KR" altLang="en-US" dirty="0"/>
-              <a:t>유료</a:t>
-            </a:r>
-            <a:r>
-              <a:rPr lang="en-US" altLang="ko-KR" dirty="0"/>
-              <a:t>/</a:t>
-            </a:r>
-            <a:r>
-              <a:rPr lang="ko-KR" altLang="en-US" dirty="0"/>
-              <a:t>무료 </a:t>
-            </a:r>
-            <a:r>
-              <a:rPr lang="ko-KR" altLang="en-US" dirty="0" err="1"/>
-              <a:t>에셋을</a:t>
-            </a:r>
-            <a:r>
-              <a:rPr lang="ko-KR" altLang="en-US" dirty="0"/>
-              <a:t> 구매하고 다운로드하는 곳</a:t>
-            </a:r>
-            <a:endParaRPr lang="en-US" altLang="ko-KR" dirty="0"/>
-          </a:p>
-          <a:p>
-            <a:pPr lvl="1"/>
-            <a:r>
-              <a:rPr lang="ko-KR" altLang="en-US" dirty="0"/>
-              <a:t>툴</a:t>
-            </a:r>
-            <a:r>
-              <a:rPr lang="en-US" altLang="ko-KR" dirty="0"/>
-              <a:t>, </a:t>
-            </a:r>
-            <a:r>
-              <a:rPr lang="ko-KR" altLang="en-US" dirty="0"/>
-              <a:t>사운드</a:t>
-            </a:r>
-            <a:r>
-              <a:rPr lang="en-US" altLang="ko-KR" dirty="0"/>
-              <a:t>, </a:t>
-            </a:r>
-            <a:r>
-              <a:rPr lang="ko-KR" altLang="en-US" dirty="0"/>
-              <a:t>효과</a:t>
-            </a:r>
-            <a:r>
-              <a:rPr lang="en-US" altLang="ko-KR" dirty="0"/>
-              <a:t>, </a:t>
-            </a:r>
-            <a:r>
-              <a:rPr lang="ko-KR" altLang="en-US" dirty="0"/>
-              <a:t>아이콘</a:t>
-            </a:r>
-            <a:r>
-              <a:rPr lang="en-US" altLang="ko-KR" dirty="0"/>
-              <a:t>, …</a:t>
-            </a:r>
-          </a:p>
-          <a:p>
-            <a:r>
-              <a:rPr lang="ko-KR" altLang="en-US" dirty="0"/>
-              <a:t>실습용을 쓸 것을 다운로드해보자</a:t>
-            </a:r>
-            <a:endParaRPr lang="en-US" altLang="ko-KR" dirty="0"/>
-          </a:p>
-        </p:txBody>
-      </p:sp>
-    </p:spTree>
-    <p:extLst>
-      <p:ext uri="{BB962C8B-B14F-4D97-AF65-F5344CB8AC3E}">
-        <p14:creationId xmlns:p14="http://schemas.microsoft.com/office/powerpoint/2010/main" val="2517254161"/>
-      </p:ext>
-    </p:extLst>
-  </p:cSld>
-  <p:clrMapOvr>
-    <a:masterClrMapping/>
-  </p:clrMapOvr>
-</p:sld>
-</file>
-
 <file path=ppt/slides/slide32.xml><?xml version="1.0" encoding="utf-8"?>
 <p:sld xmlns:a="http://schemas.openxmlformats.org/drawingml/2006/main" xmlns:r="http://schemas.openxmlformats.org/officeDocument/2006/relationships" xmlns:p="http://schemas.openxmlformats.org/presentationml/2006/main">
   <p:cSld>
@@ -9051,6 +9659,154 @@
           <p:cNvPr id="2" name="제목 1">
             <a:extLst>
               <a:ext uri="{FF2B5EF4-FFF2-40B4-BE49-F238E27FC236}">
+                <a16:creationId xmlns:a16="http://schemas.microsoft.com/office/drawing/2014/main" id="{558B2A02-8350-4AAB-8CCD-8F5A113BEE25}"/>
+              </a:ext>
+            </a:extLst>
+          </p:cNvPr>
+          <p:cNvSpPr>
+            <a:spLocks noGrp="1"/>
+          </p:cNvSpPr>
+          <p:nvPr>
+            <p:ph type="title"/>
+          </p:nvPr>
+        </p:nvSpPr>
+        <p:spPr/>
+        <p:txBody>
+          <a:bodyPr>
+            <a:normAutofit/>
+          </a:bodyPr>
+          <a:lstStyle/>
+          <a:p>
+            <a:r>
+              <a:rPr lang="en-US" altLang="ko-KR" dirty="0"/>
+              <a:t>Asset Store</a:t>
+            </a:r>
+            <a:endParaRPr lang="ko-KR" altLang="en-US" dirty="0"/>
+          </a:p>
+        </p:txBody>
+      </p:sp>
+      <p:sp>
+        <p:nvSpPr>
+          <p:cNvPr id="3" name="내용 개체 틀 2">
+            <a:extLst>
+              <a:ext uri="{FF2B5EF4-FFF2-40B4-BE49-F238E27FC236}">
+                <a16:creationId xmlns:a16="http://schemas.microsoft.com/office/drawing/2014/main" id="{1986919F-9005-44C0-9760-791EEB5FF155}"/>
+              </a:ext>
+            </a:extLst>
+          </p:cNvPr>
+          <p:cNvSpPr>
+            <a:spLocks noGrp="1"/>
+          </p:cNvSpPr>
+          <p:nvPr>
+            <p:ph idx="1"/>
+          </p:nvPr>
+        </p:nvSpPr>
+        <p:spPr/>
+        <p:txBody>
+          <a:bodyPr/>
+          <a:lstStyle/>
+          <a:p>
+            <a:r>
+              <a:rPr lang="ko-KR" altLang="en-US" dirty="0"/>
+              <a:t>유료</a:t>
+            </a:r>
+            <a:r>
+              <a:rPr lang="en-US" altLang="ko-KR" dirty="0"/>
+              <a:t>/</a:t>
+            </a:r>
+            <a:r>
+              <a:rPr lang="ko-KR" altLang="en-US" dirty="0"/>
+              <a:t>무료 </a:t>
+            </a:r>
+            <a:r>
+              <a:rPr lang="ko-KR" altLang="en-US" dirty="0" err="1"/>
+              <a:t>에셋을</a:t>
+            </a:r>
+            <a:r>
+              <a:rPr lang="ko-KR" altLang="en-US" dirty="0"/>
+              <a:t> 구매하고 다운로드하는 곳</a:t>
+            </a:r>
+            <a:endParaRPr lang="en-US" altLang="ko-KR" dirty="0"/>
+          </a:p>
+          <a:p>
+            <a:pPr lvl="1"/>
+            <a:r>
+              <a:rPr lang="ko-KR" altLang="en-US" dirty="0"/>
+              <a:t>툴</a:t>
+            </a:r>
+            <a:r>
+              <a:rPr lang="en-US" altLang="ko-KR" dirty="0"/>
+              <a:t>, </a:t>
+            </a:r>
+            <a:r>
+              <a:rPr lang="ko-KR" altLang="en-US" dirty="0"/>
+              <a:t>사운드</a:t>
+            </a:r>
+            <a:r>
+              <a:rPr lang="en-US" altLang="ko-KR" dirty="0"/>
+              <a:t>, </a:t>
+            </a:r>
+            <a:r>
+              <a:rPr lang="ko-KR" altLang="en-US" dirty="0"/>
+              <a:t>효과</a:t>
+            </a:r>
+            <a:r>
+              <a:rPr lang="en-US" altLang="ko-KR" dirty="0"/>
+              <a:t>, </a:t>
+            </a:r>
+            <a:r>
+              <a:rPr lang="ko-KR" altLang="en-US" dirty="0"/>
+              <a:t>아이콘</a:t>
+            </a:r>
+            <a:r>
+              <a:rPr lang="en-US" altLang="ko-KR" dirty="0"/>
+              <a:t>, …</a:t>
+            </a:r>
+          </a:p>
+          <a:p>
+            <a:r>
+              <a:rPr lang="ko-KR" altLang="en-US" dirty="0"/>
+              <a:t>실습용을 쓸 것을 다운로드해보자</a:t>
+            </a:r>
+            <a:endParaRPr lang="en-US" altLang="ko-KR" dirty="0"/>
+          </a:p>
+        </p:txBody>
+      </p:sp>
+    </p:spTree>
+    <p:extLst>
+      <p:ext uri="{BB962C8B-B14F-4D97-AF65-F5344CB8AC3E}">
+        <p14:creationId xmlns:p14="http://schemas.microsoft.com/office/powerpoint/2010/main" val="2517254161"/>
+      </p:ext>
+    </p:extLst>
+  </p:cSld>
+  <p:clrMapOvr>
+    <a:masterClrMapping/>
+  </p:clrMapOvr>
+</p:sld>
+</file>
+
+<file path=ppt/slides/slide33.xml><?xml version="1.0" encoding="utf-8"?>
+<p:sld xmlns:a="http://schemas.openxmlformats.org/drawingml/2006/main" xmlns:r="http://schemas.openxmlformats.org/officeDocument/2006/relationships" xmlns:p="http://schemas.openxmlformats.org/presentationml/2006/main">
+  <p:cSld>
+    <p:spTree>
+      <p:nvGrpSpPr>
+        <p:cNvPr id="1" name=""/>
+        <p:cNvGrpSpPr/>
+        <p:nvPr/>
+      </p:nvGrpSpPr>
+      <p:grpSpPr>
+        <a:xfrm>
+          <a:off x="0" y="0"/>
+          <a:ext cx="0" cy="0"/>
+          <a:chOff x="0" y="0"/>
+          <a:chExt cx="0" cy="0"/>
+        </a:xfrm>
+      </p:grpSpPr>
+      <p:sp>
+        <p:nvSpPr>
+          <p:cNvPr id="2" name="제목 1">
+            <a:extLst>
+              <a:ext uri="{FF2B5EF4-FFF2-40B4-BE49-F238E27FC236}">
                 <a16:creationId xmlns:a16="http://schemas.microsoft.com/office/drawing/2014/main" id="{791378DF-8585-48A9-B8E1-C64F72E5A032}"/>
               </a:ext>
             </a:extLst>
@@ -9126,7 +9882,7 @@
 </p:sld>
 </file>
 
-<file path=ppt/slides/slide33.xml><?xml version="1.0" encoding="utf-8"?>
+<file path=ppt/slides/slide34.xml><?xml version="1.0" encoding="utf-8"?>
 <p:sld xmlns:a="http://schemas.openxmlformats.org/drawingml/2006/main" xmlns:r="http://schemas.openxmlformats.org/officeDocument/2006/relationships" xmlns:p="http://schemas.openxmlformats.org/presentationml/2006/main">
   <p:cSld>
     <p:spTree>

</xml_diff>